<commit_message>
offline message server side
</commit_message>
<xml_diff>
--- a/Báo cáo.pptx
+++ b/Báo cáo.pptx
@@ -5,43 +5,42 @@
     <p:sldMasterId id="2147483659" r:id="rId1"/>
   </p:sldMasterIdLst>
   <p:notesMasterIdLst>
-    <p:notesMasterId r:id="rId12"/>
+    <p:notesMasterId r:id="rId11"/>
   </p:notesMasterIdLst>
   <p:sldIdLst>
     <p:sldId id="256" r:id="rId2"/>
-    <p:sldId id="258" r:id="rId3"/>
-    <p:sldId id="259" r:id="rId4"/>
-    <p:sldId id="261" r:id="rId5"/>
-    <p:sldId id="297" r:id="rId6"/>
-    <p:sldId id="295" r:id="rId7"/>
-    <p:sldId id="267" r:id="rId8"/>
-    <p:sldId id="296" r:id="rId9"/>
-    <p:sldId id="283" r:id="rId10"/>
-    <p:sldId id="278" r:id="rId11"/>
+    <p:sldId id="259" r:id="rId3"/>
+    <p:sldId id="261" r:id="rId4"/>
+    <p:sldId id="297" r:id="rId5"/>
+    <p:sldId id="295" r:id="rId6"/>
+    <p:sldId id="267" r:id="rId7"/>
+    <p:sldId id="296" r:id="rId8"/>
+    <p:sldId id="283" r:id="rId9"/>
+    <p:sldId id="278" r:id="rId10"/>
   </p:sldIdLst>
   <p:sldSz cx="9144000" cy="5143500" type="screen16x9"/>
   <p:notesSz cx="6858000" cy="9144000"/>
   <p:embeddedFontLst>
     <p:embeddedFont>
       <p:font typeface="Calibri" panose="020F0502020204030204" pitchFamily="34" charset="0"/>
-      <p:regular r:id="rId13"/>
-      <p:bold r:id="rId14"/>
-      <p:italic r:id="rId15"/>
-      <p:boldItalic r:id="rId16"/>
+      <p:regular r:id="rId12"/>
+      <p:bold r:id="rId13"/>
+      <p:italic r:id="rId14"/>
+      <p:boldItalic r:id="rId15"/>
     </p:embeddedFont>
     <p:embeddedFont>
       <p:font typeface="Montserrat" panose="00000500000000000000" pitchFamily="2" charset="0"/>
-      <p:regular r:id="rId17"/>
-      <p:bold r:id="rId18"/>
-      <p:italic r:id="rId19"/>
-      <p:boldItalic r:id="rId20"/>
+      <p:regular r:id="rId16"/>
+      <p:bold r:id="rId17"/>
+      <p:italic r:id="rId18"/>
+      <p:boldItalic r:id="rId19"/>
     </p:embeddedFont>
     <p:embeddedFont>
       <p:font typeface="Roboto" panose="02000000000000000000" pitchFamily="2" charset="0"/>
-      <p:regular r:id="rId21"/>
-      <p:bold r:id="rId22"/>
-      <p:italic r:id="rId23"/>
-      <p:boldItalic r:id="rId24"/>
+      <p:regular r:id="rId20"/>
+      <p:bold r:id="rId21"/>
+      <p:italic r:id="rId22"/>
+      <p:boldItalic r:id="rId23"/>
     </p:embeddedFont>
   </p:embeddedFontLst>
   <p:defaultTextStyle>
@@ -273,6 +272,11 @@
       </a:defRPr>
     </a:lvl9pPr>
   </p:defaultTextStyle>
+  <p:extLst>
+    <p:ext uri="{EFAFB233-063F-42B5-8137-9DF3F51BA10A}">
+      <p15:sldGuideLst xmlns:p15="http://schemas.microsoft.com/office/powerpoint/2012/main"/>
+    </p:ext>
+  </p:extLst>
 </p:presentation>
 </file>
 
@@ -821,215 +825,7 @@
 </p:notes>
 </file>
 
-<file path=ppt/notesSlides/notesSlide10.xml><?xml version="1.0" encoding="utf-8"?>
-<p:notes xmlns:a="http://schemas.openxmlformats.org/drawingml/2006/main" xmlns:r="http://schemas.openxmlformats.org/officeDocument/2006/relationships" xmlns:p="http://schemas.openxmlformats.org/presentationml/2006/main" showMasterSp="0" showMasterPhAnim="0">
-  <p:cSld>
-    <p:spTree>
-      <p:nvGrpSpPr>
-        <p:cNvPr id="1" name="Shape 306"/>
-        <p:cNvGrpSpPr/>
-        <p:nvPr/>
-      </p:nvGrpSpPr>
-      <p:grpSpPr>
-        <a:xfrm>
-          <a:off x="0" y="0"/>
-          <a:ext cx="0" cy="0"/>
-          <a:chOff x="0" y="0"/>
-          <a:chExt cx="0" cy="0"/>
-        </a:xfrm>
-      </p:grpSpPr>
-      <p:sp>
-        <p:nvSpPr>
-          <p:cNvPr id="307" name="Google Shape;307;g35ed75ccf_022:notes"/>
-          <p:cNvSpPr>
-            <a:spLocks noGrp="1" noRot="1" noChangeAspect="1"/>
-          </p:cNvSpPr>
-          <p:nvPr>
-            <p:ph type="sldImg" idx="2"/>
-          </p:nvPr>
-        </p:nvSpPr>
-        <p:spPr>
-          <a:xfrm>
-            <a:off x="381000" y="685800"/>
-            <a:ext cx="6096000" cy="3429000"/>
-          </a:xfrm>
-          <a:custGeom>
-            <a:avLst/>
-            <a:gdLst/>
-            <a:ahLst/>
-            <a:cxnLst/>
-            <a:rect l="l" t="t" r="r" b="b"/>
-            <a:pathLst>
-              <a:path w="120000" h="120000" extrusionOk="0">
-                <a:moveTo>
-                  <a:pt x="0" y="0"/>
-                </a:moveTo>
-                <a:lnTo>
-                  <a:pt x="120000" y="0"/>
-                </a:lnTo>
-                <a:lnTo>
-                  <a:pt x="120000" y="120000"/>
-                </a:lnTo>
-                <a:lnTo>
-                  <a:pt x="0" y="120000"/>
-                </a:lnTo>
-                <a:close/>
-              </a:path>
-            </a:pathLst>
-          </a:custGeom>
-        </p:spPr>
-      </p:sp>
-      <p:sp>
-        <p:nvSpPr>
-          <p:cNvPr id="308" name="Google Shape;308;g35ed75ccf_022:notes"/>
-          <p:cNvSpPr txBox="1">
-            <a:spLocks noGrp="1"/>
-          </p:cNvSpPr>
-          <p:nvPr>
-            <p:ph type="body" idx="1"/>
-          </p:nvPr>
-        </p:nvSpPr>
-        <p:spPr>
-          <a:xfrm>
-            <a:off x="685800" y="4343400"/>
-            <a:ext cx="5486400" cy="4114800"/>
-          </a:xfrm>
-          <a:prstGeom prst="rect">
-            <a:avLst/>
-          </a:prstGeom>
-        </p:spPr>
-        <p:txBody>
-          <a:bodyPr spcFirstLastPara="1" wrap="square" lIns="91425" tIns="91425" rIns="91425" bIns="91425" anchor="t" anchorCtr="0">
-            <a:noAutofit/>
-          </a:bodyPr>
-          <a:lstStyle/>
-          <a:p>
-            <a:pPr marL="0" lvl="0" indent="0" algn="l" rtl="0">
-              <a:spcBef>
-                <a:spcPts val="0"/>
-              </a:spcBef>
-              <a:spcAft>
-                <a:spcPts val="0"/>
-              </a:spcAft>
-              <a:buNone/>
-            </a:pPr>
-            <a:endParaRPr/>
-          </a:p>
-        </p:txBody>
-      </p:sp>
-    </p:spTree>
-  </p:cSld>
-  <p:clrMapOvr>
-    <a:masterClrMapping/>
-  </p:clrMapOvr>
-</p:notes>
-</file>
-
 <file path=ppt/notesSlides/notesSlide2.xml><?xml version="1.0" encoding="utf-8"?>
-<p:notes xmlns:a="http://schemas.openxmlformats.org/drawingml/2006/main" xmlns:r="http://schemas.openxmlformats.org/officeDocument/2006/relationships" xmlns:p="http://schemas.openxmlformats.org/presentationml/2006/main" showMasterSp="0" showMasterPhAnim="0">
-  <p:cSld>
-    <p:spTree>
-      <p:nvGrpSpPr>
-        <p:cNvPr id="1" name="Shape 71"/>
-        <p:cNvGrpSpPr/>
-        <p:nvPr/>
-      </p:nvGrpSpPr>
-      <p:grpSpPr>
-        <a:xfrm>
-          <a:off x="0" y="0"/>
-          <a:ext cx="0" cy="0"/>
-          <a:chOff x="0" y="0"/>
-          <a:chExt cx="0" cy="0"/>
-        </a:xfrm>
-      </p:grpSpPr>
-      <p:sp>
-        <p:nvSpPr>
-          <p:cNvPr id="72" name="Google Shape;72;g35f391192_04:notes"/>
-          <p:cNvSpPr>
-            <a:spLocks noGrp="1" noRot="1" noChangeAspect="1"/>
-          </p:cNvSpPr>
-          <p:nvPr>
-            <p:ph type="sldImg" idx="2"/>
-          </p:nvPr>
-        </p:nvSpPr>
-        <p:spPr>
-          <a:xfrm>
-            <a:off x="381000" y="685800"/>
-            <a:ext cx="6096000" cy="3429000"/>
-          </a:xfrm>
-          <a:custGeom>
-            <a:avLst/>
-            <a:gdLst/>
-            <a:ahLst/>
-            <a:cxnLst/>
-            <a:rect l="l" t="t" r="r" b="b"/>
-            <a:pathLst>
-              <a:path w="120000" h="120000" extrusionOk="0">
-                <a:moveTo>
-                  <a:pt x="0" y="0"/>
-                </a:moveTo>
-                <a:lnTo>
-                  <a:pt x="120000" y="0"/>
-                </a:lnTo>
-                <a:lnTo>
-                  <a:pt x="120000" y="120000"/>
-                </a:lnTo>
-                <a:lnTo>
-                  <a:pt x="0" y="120000"/>
-                </a:lnTo>
-                <a:close/>
-              </a:path>
-            </a:pathLst>
-          </a:custGeom>
-        </p:spPr>
-      </p:sp>
-      <p:sp>
-        <p:nvSpPr>
-          <p:cNvPr id="73" name="Google Shape;73;g35f391192_04:notes"/>
-          <p:cNvSpPr txBox="1">
-            <a:spLocks noGrp="1"/>
-          </p:cNvSpPr>
-          <p:nvPr>
-            <p:ph type="body" idx="1"/>
-          </p:nvPr>
-        </p:nvSpPr>
-        <p:spPr>
-          <a:xfrm>
-            <a:off x="685800" y="4343400"/>
-            <a:ext cx="5486400" cy="4114800"/>
-          </a:xfrm>
-          <a:prstGeom prst="rect">
-            <a:avLst/>
-          </a:prstGeom>
-        </p:spPr>
-        <p:txBody>
-          <a:bodyPr spcFirstLastPara="1" wrap="square" lIns="91425" tIns="91425" rIns="91425" bIns="91425" anchor="t" anchorCtr="0">
-            <a:noAutofit/>
-          </a:bodyPr>
-          <a:lstStyle/>
-          <a:p>
-            <a:pPr marL="0" lvl="0" indent="0" algn="l" rtl="0">
-              <a:spcBef>
-                <a:spcPts val="0"/>
-              </a:spcBef>
-              <a:spcAft>
-                <a:spcPts val="0"/>
-              </a:spcAft>
-              <a:buNone/>
-            </a:pPr>
-            <a:endParaRPr/>
-          </a:p>
-        </p:txBody>
-      </p:sp>
-    </p:spTree>
-  </p:cSld>
-  <p:clrMapOvr>
-    <a:masterClrMapping/>
-  </p:clrMapOvr>
-</p:notes>
-</file>
-
-<file path=ppt/notesSlides/notesSlide3.xml><?xml version="1.0" encoding="utf-8"?>
 <p:notes xmlns:a="http://schemas.openxmlformats.org/drawingml/2006/main" xmlns:r="http://schemas.openxmlformats.org/officeDocument/2006/relationships" xmlns:p="http://schemas.openxmlformats.org/presentationml/2006/main" showMasterSp="0" showMasterPhAnim="0">
   <p:cSld>
     <p:spTree>
@@ -1090,6 +886,110 @@
       <p:sp>
         <p:nvSpPr>
           <p:cNvPr id="81" name="Google Shape;81;g35f391192_029:notes"/>
+          <p:cNvSpPr txBox="1">
+            <a:spLocks noGrp="1"/>
+          </p:cNvSpPr>
+          <p:nvPr>
+            <p:ph type="body" idx="1"/>
+          </p:nvPr>
+        </p:nvSpPr>
+        <p:spPr>
+          <a:xfrm>
+            <a:off x="685800" y="4343400"/>
+            <a:ext cx="5486400" cy="4114800"/>
+          </a:xfrm>
+          <a:prstGeom prst="rect">
+            <a:avLst/>
+          </a:prstGeom>
+        </p:spPr>
+        <p:txBody>
+          <a:bodyPr spcFirstLastPara="1" wrap="square" lIns="91425" tIns="91425" rIns="91425" bIns="91425" anchor="t" anchorCtr="0">
+            <a:noAutofit/>
+          </a:bodyPr>
+          <a:lstStyle/>
+          <a:p>
+            <a:pPr marL="0" lvl="0" indent="0" algn="l" rtl="0">
+              <a:spcBef>
+                <a:spcPts val="0"/>
+              </a:spcBef>
+              <a:spcAft>
+                <a:spcPts val="0"/>
+              </a:spcAft>
+              <a:buNone/>
+            </a:pPr>
+            <a:endParaRPr/>
+          </a:p>
+        </p:txBody>
+      </p:sp>
+    </p:spTree>
+  </p:cSld>
+  <p:clrMapOvr>
+    <a:masterClrMapping/>
+  </p:clrMapOvr>
+</p:notes>
+</file>
+
+<file path=ppt/notesSlides/notesSlide3.xml><?xml version="1.0" encoding="utf-8"?>
+<p:notes xmlns:a="http://schemas.openxmlformats.org/drawingml/2006/main" xmlns:r="http://schemas.openxmlformats.org/officeDocument/2006/relationships" xmlns:p="http://schemas.openxmlformats.org/presentationml/2006/main" showMasterSp="0" showMasterPhAnim="0">
+  <p:cSld>
+    <p:spTree>
+      <p:nvGrpSpPr>
+        <p:cNvPr id="1" name="Shape 92"/>
+        <p:cNvGrpSpPr/>
+        <p:nvPr/>
+      </p:nvGrpSpPr>
+      <p:grpSpPr>
+        <a:xfrm>
+          <a:off x="0" y="0"/>
+          <a:ext cx="0" cy="0"/>
+          <a:chOff x="0" y="0"/>
+          <a:chExt cx="0" cy="0"/>
+        </a:xfrm>
+      </p:grpSpPr>
+      <p:sp>
+        <p:nvSpPr>
+          <p:cNvPr id="93" name="Google Shape;93;p:notes"/>
+          <p:cNvSpPr>
+            <a:spLocks noGrp="1" noRot="1" noChangeAspect="1"/>
+          </p:cNvSpPr>
+          <p:nvPr>
+            <p:ph type="sldImg" idx="2"/>
+          </p:nvPr>
+        </p:nvSpPr>
+        <p:spPr>
+          <a:xfrm>
+            <a:off x="381000" y="685800"/>
+            <a:ext cx="6096000" cy="3429000"/>
+          </a:xfrm>
+          <a:custGeom>
+            <a:avLst/>
+            <a:gdLst/>
+            <a:ahLst/>
+            <a:cxnLst/>
+            <a:rect l="l" t="t" r="r" b="b"/>
+            <a:pathLst>
+              <a:path w="120000" h="120000" extrusionOk="0">
+                <a:moveTo>
+                  <a:pt x="0" y="0"/>
+                </a:moveTo>
+                <a:lnTo>
+                  <a:pt x="120000" y="0"/>
+                </a:lnTo>
+                <a:lnTo>
+                  <a:pt x="120000" y="120000"/>
+                </a:lnTo>
+                <a:lnTo>
+                  <a:pt x="0" y="120000"/>
+                </a:lnTo>
+                <a:close/>
+              </a:path>
+            </a:pathLst>
+          </a:custGeom>
+        </p:spPr>
+      </p:sp>
+      <p:sp>
+        <p:nvSpPr>
+          <p:cNvPr id="94" name="Google Shape;94;p:notes"/>
           <p:cNvSpPr txBox="1">
             <a:spLocks noGrp="1"/>
           </p:cNvSpPr>
@@ -1230,110 +1130,6 @@
         </p:txBody>
       </p:sp>
     </p:spTree>
-  </p:cSld>
-  <p:clrMapOvr>
-    <a:masterClrMapping/>
-  </p:clrMapOvr>
-</p:notes>
-</file>
-
-<file path=ppt/notesSlides/notesSlide5.xml><?xml version="1.0" encoding="utf-8"?>
-<p:notes xmlns:a="http://schemas.openxmlformats.org/drawingml/2006/main" xmlns:r="http://schemas.openxmlformats.org/officeDocument/2006/relationships" xmlns:p="http://schemas.openxmlformats.org/presentationml/2006/main" showMasterSp="0" showMasterPhAnim="0">
-  <p:cSld>
-    <p:spTree>
-      <p:nvGrpSpPr>
-        <p:cNvPr id="1" name="Shape 92"/>
-        <p:cNvGrpSpPr/>
-        <p:nvPr/>
-      </p:nvGrpSpPr>
-      <p:grpSpPr>
-        <a:xfrm>
-          <a:off x="0" y="0"/>
-          <a:ext cx="0" cy="0"/>
-          <a:chOff x="0" y="0"/>
-          <a:chExt cx="0" cy="0"/>
-        </a:xfrm>
-      </p:grpSpPr>
-      <p:sp>
-        <p:nvSpPr>
-          <p:cNvPr id="93" name="Google Shape;93;p:notes"/>
-          <p:cNvSpPr>
-            <a:spLocks noGrp="1" noRot="1" noChangeAspect="1"/>
-          </p:cNvSpPr>
-          <p:nvPr>
-            <p:ph type="sldImg" idx="2"/>
-          </p:nvPr>
-        </p:nvSpPr>
-        <p:spPr>
-          <a:xfrm>
-            <a:off x="381000" y="685800"/>
-            <a:ext cx="6096000" cy="3429000"/>
-          </a:xfrm>
-          <a:custGeom>
-            <a:avLst/>
-            <a:gdLst/>
-            <a:ahLst/>
-            <a:cxnLst/>
-            <a:rect l="l" t="t" r="r" b="b"/>
-            <a:pathLst>
-              <a:path w="120000" h="120000" extrusionOk="0">
-                <a:moveTo>
-                  <a:pt x="0" y="0"/>
-                </a:moveTo>
-                <a:lnTo>
-                  <a:pt x="120000" y="0"/>
-                </a:lnTo>
-                <a:lnTo>
-                  <a:pt x="120000" y="120000"/>
-                </a:lnTo>
-                <a:lnTo>
-                  <a:pt x="0" y="120000"/>
-                </a:lnTo>
-                <a:close/>
-              </a:path>
-            </a:pathLst>
-          </a:custGeom>
-        </p:spPr>
-      </p:sp>
-      <p:sp>
-        <p:nvSpPr>
-          <p:cNvPr id="94" name="Google Shape;94;p:notes"/>
-          <p:cNvSpPr txBox="1">
-            <a:spLocks noGrp="1"/>
-          </p:cNvSpPr>
-          <p:nvPr>
-            <p:ph type="body" idx="1"/>
-          </p:nvPr>
-        </p:nvSpPr>
-        <p:spPr>
-          <a:xfrm>
-            <a:off x="685800" y="4343400"/>
-            <a:ext cx="5486400" cy="4114800"/>
-          </a:xfrm>
-          <a:prstGeom prst="rect">
-            <a:avLst/>
-          </a:prstGeom>
-        </p:spPr>
-        <p:txBody>
-          <a:bodyPr spcFirstLastPara="1" wrap="square" lIns="91425" tIns="91425" rIns="91425" bIns="91425" anchor="t" anchorCtr="0">
-            <a:noAutofit/>
-          </a:bodyPr>
-          <a:lstStyle/>
-          <a:p>
-            <a:pPr marL="0" lvl="0" indent="0" algn="l" rtl="0">
-              <a:spcBef>
-                <a:spcPts val="0"/>
-              </a:spcBef>
-              <a:spcAft>
-                <a:spcPts val="0"/>
-              </a:spcAft>
-              <a:buNone/>
-            </a:pPr>
-            <a:endParaRPr/>
-          </a:p>
-        </p:txBody>
-      </p:sp>
-    </p:spTree>
     <p:extLst>
       <p:ext uri="{BB962C8B-B14F-4D97-AF65-F5344CB8AC3E}">
         <p14:creationId xmlns:p14="http://schemas.microsoft.com/office/powerpoint/2010/main" val="3432902916"/>
@@ -1346,7 +1142,7 @@
 </p:notes>
 </file>
 
-<file path=ppt/notesSlides/notesSlide6.xml><?xml version="1.0" encoding="utf-8"?>
+<file path=ppt/notesSlides/notesSlide5.xml><?xml version="1.0" encoding="utf-8"?>
 <p:notes xmlns:a="http://schemas.openxmlformats.org/drawingml/2006/main" xmlns:r="http://schemas.openxmlformats.org/officeDocument/2006/relationships" xmlns:p="http://schemas.openxmlformats.org/presentationml/2006/main" showMasterSp="0" showMasterPhAnim="0">
   <p:cSld>
     <p:spTree>
@@ -1455,7 +1251,7 @@
 </p:notes>
 </file>
 
-<file path=ppt/notesSlides/notesSlide7.xml><?xml version="1.0" encoding="utf-8"?>
+<file path=ppt/notesSlides/notesSlide6.xml><?xml version="1.0" encoding="utf-8"?>
 <p:notes xmlns:a="http://schemas.openxmlformats.org/drawingml/2006/main" xmlns:r="http://schemas.openxmlformats.org/officeDocument/2006/relationships" xmlns:p="http://schemas.openxmlformats.org/presentationml/2006/main" showMasterSp="0" showMasterPhAnim="0">
   <p:cSld>
     <p:spTree>
@@ -1559,7 +1355,7 @@
 </p:notes>
 </file>
 
-<file path=ppt/notesSlides/notesSlide8.xml><?xml version="1.0" encoding="utf-8"?>
+<file path=ppt/notesSlides/notesSlide7.xml><?xml version="1.0" encoding="utf-8"?>
 <p:notes xmlns:a="http://schemas.openxmlformats.org/drawingml/2006/main" xmlns:r="http://schemas.openxmlformats.org/officeDocument/2006/relationships" xmlns:p="http://schemas.openxmlformats.org/presentationml/2006/main" showMasterSp="0" showMasterPhAnim="0">
   <p:cSld>
     <p:spTree>
@@ -1668,7 +1464,7 @@
 </p:notes>
 </file>
 
-<file path=ppt/notesSlides/notesSlide9.xml><?xml version="1.0" encoding="utf-8"?>
+<file path=ppt/notesSlides/notesSlide8.xml><?xml version="1.0" encoding="utf-8"?>
 <p:notes xmlns:a="http://schemas.openxmlformats.org/drawingml/2006/main" xmlns:r="http://schemas.openxmlformats.org/officeDocument/2006/relationships" xmlns:p="http://schemas.openxmlformats.org/presentationml/2006/main" showMasterSp="0" showMasterPhAnim="0">
   <p:cSld>
     <p:spTree>
@@ -1729,6 +1525,110 @@
       <p:sp>
         <p:nvSpPr>
           <p:cNvPr id="380" name="Google Shape;380;gbc90258b44_0_47:notes"/>
+          <p:cNvSpPr txBox="1">
+            <a:spLocks noGrp="1"/>
+          </p:cNvSpPr>
+          <p:nvPr>
+            <p:ph type="body" idx="1"/>
+          </p:nvPr>
+        </p:nvSpPr>
+        <p:spPr>
+          <a:xfrm>
+            <a:off x="685800" y="4343400"/>
+            <a:ext cx="5486400" cy="4114800"/>
+          </a:xfrm>
+          <a:prstGeom prst="rect">
+            <a:avLst/>
+          </a:prstGeom>
+        </p:spPr>
+        <p:txBody>
+          <a:bodyPr spcFirstLastPara="1" wrap="square" lIns="91425" tIns="91425" rIns="91425" bIns="91425" anchor="t" anchorCtr="0">
+            <a:noAutofit/>
+          </a:bodyPr>
+          <a:lstStyle/>
+          <a:p>
+            <a:pPr marL="0" lvl="0" indent="0" algn="l" rtl="0">
+              <a:spcBef>
+                <a:spcPts val="0"/>
+              </a:spcBef>
+              <a:spcAft>
+                <a:spcPts val="0"/>
+              </a:spcAft>
+              <a:buNone/>
+            </a:pPr>
+            <a:endParaRPr/>
+          </a:p>
+        </p:txBody>
+      </p:sp>
+    </p:spTree>
+  </p:cSld>
+  <p:clrMapOvr>
+    <a:masterClrMapping/>
+  </p:clrMapOvr>
+</p:notes>
+</file>
+
+<file path=ppt/notesSlides/notesSlide9.xml><?xml version="1.0" encoding="utf-8"?>
+<p:notes xmlns:a="http://schemas.openxmlformats.org/drawingml/2006/main" xmlns:r="http://schemas.openxmlformats.org/officeDocument/2006/relationships" xmlns:p="http://schemas.openxmlformats.org/presentationml/2006/main" showMasterSp="0" showMasterPhAnim="0">
+  <p:cSld>
+    <p:spTree>
+      <p:nvGrpSpPr>
+        <p:cNvPr id="1" name="Shape 306"/>
+        <p:cNvGrpSpPr/>
+        <p:nvPr/>
+      </p:nvGrpSpPr>
+      <p:grpSpPr>
+        <a:xfrm>
+          <a:off x="0" y="0"/>
+          <a:ext cx="0" cy="0"/>
+          <a:chOff x="0" y="0"/>
+          <a:chExt cx="0" cy="0"/>
+        </a:xfrm>
+      </p:grpSpPr>
+      <p:sp>
+        <p:nvSpPr>
+          <p:cNvPr id="307" name="Google Shape;307;g35ed75ccf_022:notes"/>
+          <p:cNvSpPr>
+            <a:spLocks noGrp="1" noRot="1" noChangeAspect="1"/>
+          </p:cNvSpPr>
+          <p:nvPr>
+            <p:ph type="sldImg" idx="2"/>
+          </p:nvPr>
+        </p:nvSpPr>
+        <p:spPr>
+          <a:xfrm>
+            <a:off x="381000" y="685800"/>
+            <a:ext cx="6096000" cy="3429000"/>
+          </a:xfrm>
+          <a:custGeom>
+            <a:avLst/>
+            <a:gdLst/>
+            <a:ahLst/>
+            <a:cxnLst/>
+            <a:rect l="l" t="t" r="r" b="b"/>
+            <a:pathLst>
+              <a:path w="120000" h="120000" extrusionOk="0">
+                <a:moveTo>
+                  <a:pt x="0" y="0"/>
+                </a:moveTo>
+                <a:lnTo>
+                  <a:pt x="120000" y="0"/>
+                </a:lnTo>
+                <a:lnTo>
+                  <a:pt x="120000" y="120000"/>
+                </a:lnTo>
+                <a:lnTo>
+                  <a:pt x="0" y="120000"/>
+                </a:lnTo>
+                <a:close/>
+              </a:path>
+            </a:pathLst>
+          </a:custGeom>
+        </p:spPr>
+      </p:sp>
+      <p:sp>
+        <p:nvSpPr>
+          <p:cNvPr id="308" name="Google Shape;308;g35ed75ccf_022:notes"/>
           <p:cNvSpPr txBox="1">
             <a:spLocks noGrp="1"/>
           </p:cNvSpPr>
@@ -4837,13 +4737,19 @@
               <a:buNone/>
             </a:pPr>
             <a:r>
-              <a:rPr lang="en">
+              <a:rPr lang="en" sz="4000">
+                <a:solidFill>
+                  <a:schemeClr val="tx1"/>
+                </a:solidFill>
                 <a:latin typeface="Arial" panose="020B0604020202020204" pitchFamily="34" charset="0"/>
                 <a:cs typeface="Arial" panose="020B0604020202020204" pitchFamily="34" charset="0"/>
               </a:rPr>
-              <a:t>Báo cáo tiến độ</a:t>
+              <a:t>Báo cáo tổng kết</a:t>
             </a:r>
-            <a:endParaRPr>
+            <a:endParaRPr sz="4000">
+              <a:solidFill>
+                <a:schemeClr val="tx1"/>
+              </a:solidFill>
               <a:latin typeface="Arial" panose="020B0604020202020204" pitchFamily="34" charset="0"/>
               <a:cs typeface="Arial" panose="020B0604020202020204" pitchFamily="34" charset="0"/>
             </a:endParaRPr>
@@ -4866,7 +4772,7 @@
         </p:nvSpPr>
         <p:spPr>
           <a:xfrm>
-            <a:off x="899976" y="2986088"/>
+            <a:off x="911912" y="2791216"/>
             <a:ext cx="7498800" cy="1162674"/>
           </a:xfrm>
           <a:prstGeom prst="rect">
@@ -5131,88 +5037,424 @@
           <a:p>
             <a:pPr algn="ctr"/>
             <a:r>
-              <a:rPr lang="en-US" sz="3200" err="1">
+              <a:rPr lang="en-US" sz="2800" err="1">
                 <a:latin typeface="Arial" panose="020B0604020202020204" pitchFamily="34" charset="0"/>
                 <a:cs typeface="Arial" panose="020B0604020202020204" pitchFamily="34" charset="0"/>
               </a:rPr>
               <a:t>Đề</a:t>
             </a:r>
             <a:r>
-              <a:rPr lang="en-US" sz="3200">
+              <a:rPr lang="en-US" sz="2800">
                 <a:latin typeface="Arial" panose="020B0604020202020204" pitchFamily="34" charset="0"/>
                 <a:cs typeface="Arial" panose="020B0604020202020204" pitchFamily="34" charset="0"/>
               </a:rPr>
               <a:t> </a:t>
             </a:r>
             <a:r>
-              <a:rPr lang="en-US" sz="3200" err="1">
+              <a:rPr lang="en-US" sz="2800" err="1">
                 <a:latin typeface="Arial" panose="020B0604020202020204" pitchFamily="34" charset="0"/>
                 <a:cs typeface="Arial" panose="020B0604020202020204" pitchFamily="34" charset="0"/>
               </a:rPr>
               <a:t>tài</a:t>
             </a:r>
             <a:r>
-              <a:rPr lang="en-US" sz="3200">
+              <a:rPr lang="en-US" sz="2800">
                 <a:latin typeface="Arial" panose="020B0604020202020204" pitchFamily="34" charset="0"/>
                 <a:cs typeface="Arial" panose="020B0604020202020204" pitchFamily="34" charset="0"/>
               </a:rPr>
               <a:t>: </a:t>
             </a:r>
             <a:r>
-              <a:rPr lang="en-US" sz="3200" err="1">
+              <a:rPr lang="en-US" sz="2800" err="1">
                 <a:latin typeface="Arial" panose="020B0604020202020204" pitchFamily="34" charset="0"/>
                 <a:cs typeface="Arial" panose="020B0604020202020204" pitchFamily="34" charset="0"/>
               </a:rPr>
               <a:t>Xây</a:t>
             </a:r>
             <a:r>
-              <a:rPr lang="en-US" sz="3200">
+              <a:rPr lang="en-US" sz="2800">
                 <a:latin typeface="Arial" panose="020B0604020202020204" pitchFamily="34" charset="0"/>
                 <a:cs typeface="Arial" panose="020B0604020202020204" pitchFamily="34" charset="0"/>
               </a:rPr>
               <a:t> </a:t>
             </a:r>
             <a:r>
-              <a:rPr lang="en-US" sz="3200" err="1">
+              <a:rPr lang="en-US" sz="2800" err="1">
                 <a:latin typeface="Arial" panose="020B0604020202020204" pitchFamily="34" charset="0"/>
                 <a:cs typeface="Arial" panose="020B0604020202020204" pitchFamily="34" charset="0"/>
               </a:rPr>
               <a:t>dựng</a:t>
             </a:r>
             <a:r>
-              <a:rPr lang="en-US" sz="3200">
+              <a:rPr lang="en-US" sz="2800">
                 <a:latin typeface="Arial" panose="020B0604020202020204" pitchFamily="34" charset="0"/>
                 <a:cs typeface="Arial" panose="020B0604020202020204" pitchFamily="34" charset="0"/>
               </a:rPr>
               <a:t> </a:t>
             </a:r>
             <a:r>
-              <a:rPr lang="en-US" sz="3200" err="1">
+              <a:rPr lang="en-US" sz="2800" err="1">
                 <a:latin typeface="Arial" panose="020B0604020202020204" pitchFamily="34" charset="0"/>
                 <a:cs typeface="Arial" panose="020B0604020202020204" pitchFamily="34" charset="0"/>
               </a:rPr>
               <a:t>ứng</a:t>
             </a:r>
             <a:r>
-              <a:rPr lang="en-US" sz="3200">
+              <a:rPr lang="en-US" sz="2800">
                 <a:latin typeface="Arial" panose="020B0604020202020204" pitchFamily="34" charset="0"/>
                 <a:cs typeface="Arial" panose="020B0604020202020204" pitchFamily="34" charset="0"/>
               </a:rPr>
               <a:t> </a:t>
             </a:r>
             <a:r>
-              <a:rPr lang="en-US" sz="3200" err="1">
+              <a:rPr lang="en-US" sz="2800" err="1">
                 <a:latin typeface="Arial" panose="020B0604020202020204" pitchFamily="34" charset="0"/>
                 <a:cs typeface="Arial" panose="020B0604020202020204" pitchFamily="34" charset="0"/>
               </a:rPr>
               <a:t>dụng</a:t>
             </a:r>
             <a:r>
-              <a:rPr lang="en-US" sz="3200">
+              <a:rPr lang="en-US" sz="2800">
                 <a:latin typeface="Arial" panose="020B0604020202020204" pitchFamily="34" charset="0"/>
                 <a:cs typeface="Arial" panose="020B0604020202020204" pitchFamily="34" charset="0"/>
               </a:rPr>
               <a:t> chat Server - Client</a:t>
+            </a:r>
+          </a:p>
+        </p:txBody>
+      </p:sp>
+      <p:sp>
+        <p:nvSpPr>
+          <p:cNvPr id="3" name="Google Shape;61;p13">
+            <a:extLst>
+              <a:ext uri="{FF2B5EF4-FFF2-40B4-BE49-F238E27FC236}">
+                <a16:creationId xmlns:a16="http://schemas.microsoft.com/office/drawing/2014/main" id="{963CAA2B-72C5-5EB7-2298-7DAF2D3B7E5F}"/>
+              </a:ext>
+            </a:extLst>
+          </p:cNvPr>
+          <p:cNvSpPr txBox="1">
+            <a:spLocks/>
+          </p:cNvSpPr>
+          <p:nvPr/>
+        </p:nvSpPr>
+        <p:spPr>
+          <a:xfrm>
+            <a:off x="5164111" y="3858016"/>
+            <a:ext cx="3590145" cy="1162674"/>
+          </a:xfrm>
+          <a:prstGeom prst="rect">
+            <a:avLst/>
+          </a:prstGeom>
+          <a:noFill/>
+          <a:ln>
+            <a:noFill/>
+          </a:ln>
+        </p:spPr>
+        <p:txBody>
+          <a:bodyPr spcFirstLastPara="1" wrap="square" lIns="91425" tIns="91425" rIns="91425" bIns="91425" anchor="b" anchorCtr="0">
+            <a:noAutofit/>
+          </a:bodyPr>
+          <a:lstStyle>
+            <a:defPPr marR="0" lvl="0" algn="l" rtl="0">
+              <a:lnSpc>
+                <a:spcPct val="100000"/>
+              </a:lnSpc>
+              <a:spcBef>
+                <a:spcPts val="0"/>
+              </a:spcBef>
+              <a:spcAft>
+                <a:spcPts val="0"/>
+              </a:spcAft>
+            </a:defPPr>
+            <a:lvl1pPr marR="0" lvl="0" algn="r" rtl="0">
+              <a:lnSpc>
+                <a:spcPct val="100000"/>
+              </a:lnSpc>
+              <a:spcBef>
+                <a:spcPts val="0"/>
+              </a:spcBef>
+              <a:spcAft>
+                <a:spcPts val="0"/>
+              </a:spcAft>
+              <a:buClr>
+                <a:schemeClr val="lt1"/>
+              </a:buClr>
+              <a:buSzPts val="4800"/>
+              <a:buFont typeface="Montserrat"/>
+              <a:buNone/>
+              <a:defRPr sz="4800" b="1" i="0" u="none" strike="noStrike" cap="none">
+                <a:solidFill>
+                  <a:schemeClr val="lt1"/>
+                </a:solidFill>
+                <a:latin typeface="Montserrat"/>
+                <a:ea typeface="Montserrat"/>
+                <a:cs typeface="Montserrat"/>
+                <a:sym typeface="Montserrat"/>
+              </a:defRPr>
+            </a:lvl1pPr>
+            <a:lvl2pPr marR="0" lvl="1" algn="ctr" rtl="0">
+              <a:lnSpc>
+                <a:spcPct val="100000"/>
+              </a:lnSpc>
+              <a:spcBef>
+                <a:spcPts val="0"/>
+              </a:spcBef>
+              <a:spcAft>
+                <a:spcPts val="0"/>
+              </a:spcAft>
+              <a:buClr>
+                <a:schemeClr val="lt1"/>
+              </a:buClr>
+              <a:buSzPts val="4800"/>
+              <a:buFont typeface="Montserrat"/>
+              <a:buNone/>
+              <a:defRPr sz="4800" b="1" i="0" u="none" strike="noStrike" cap="none">
+                <a:solidFill>
+                  <a:schemeClr val="lt1"/>
+                </a:solidFill>
+                <a:latin typeface="Montserrat"/>
+                <a:ea typeface="Montserrat"/>
+                <a:cs typeface="Montserrat"/>
+                <a:sym typeface="Montserrat"/>
+              </a:defRPr>
+            </a:lvl2pPr>
+            <a:lvl3pPr marR="0" lvl="2" algn="ctr" rtl="0">
+              <a:lnSpc>
+                <a:spcPct val="100000"/>
+              </a:lnSpc>
+              <a:spcBef>
+                <a:spcPts val="0"/>
+              </a:spcBef>
+              <a:spcAft>
+                <a:spcPts val="0"/>
+              </a:spcAft>
+              <a:buClr>
+                <a:schemeClr val="lt1"/>
+              </a:buClr>
+              <a:buSzPts val="4800"/>
+              <a:buFont typeface="Montserrat"/>
+              <a:buNone/>
+              <a:defRPr sz="4800" b="1" i="0" u="none" strike="noStrike" cap="none">
+                <a:solidFill>
+                  <a:schemeClr val="lt1"/>
+                </a:solidFill>
+                <a:latin typeface="Montserrat"/>
+                <a:ea typeface="Montserrat"/>
+                <a:cs typeface="Montserrat"/>
+                <a:sym typeface="Montserrat"/>
+              </a:defRPr>
+            </a:lvl3pPr>
+            <a:lvl4pPr marR="0" lvl="3" algn="ctr" rtl="0">
+              <a:lnSpc>
+                <a:spcPct val="100000"/>
+              </a:lnSpc>
+              <a:spcBef>
+                <a:spcPts val="0"/>
+              </a:spcBef>
+              <a:spcAft>
+                <a:spcPts val="0"/>
+              </a:spcAft>
+              <a:buClr>
+                <a:schemeClr val="lt1"/>
+              </a:buClr>
+              <a:buSzPts val="4800"/>
+              <a:buFont typeface="Montserrat"/>
+              <a:buNone/>
+              <a:defRPr sz="4800" b="1" i="0" u="none" strike="noStrike" cap="none">
+                <a:solidFill>
+                  <a:schemeClr val="lt1"/>
+                </a:solidFill>
+                <a:latin typeface="Montserrat"/>
+                <a:ea typeface="Montserrat"/>
+                <a:cs typeface="Montserrat"/>
+                <a:sym typeface="Montserrat"/>
+              </a:defRPr>
+            </a:lvl4pPr>
+            <a:lvl5pPr marR="0" lvl="4" algn="ctr" rtl="0">
+              <a:lnSpc>
+                <a:spcPct val="100000"/>
+              </a:lnSpc>
+              <a:spcBef>
+                <a:spcPts val="0"/>
+              </a:spcBef>
+              <a:spcAft>
+                <a:spcPts val="0"/>
+              </a:spcAft>
+              <a:buClr>
+                <a:schemeClr val="lt1"/>
+              </a:buClr>
+              <a:buSzPts val="4800"/>
+              <a:buFont typeface="Montserrat"/>
+              <a:buNone/>
+              <a:defRPr sz="4800" b="1" i="0" u="none" strike="noStrike" cap="none">
+                <a:solidFill>
+                  <a:schemeClr val="lt1"/>
+                </a:solidFill>
+                <a:latin typeface="Montserrat"/>
+                <a:ea typeface="Montserrat"/>
+                <a:cs typeface="Montserrat"/>
+                <a:sym typeface="Montserrat"/>
+              </a:defRPr>
+            </a:lvl5pPr>
+            <a:lvl6pPr marR="0" lvl="5" algn="ctr" rtl="0">
+              <a:lnSpc>
+                <a:spcPct val="100000"/>
+              </a:lnSpc>
+              <a:spcBef>
+                <a:spcPts val="0"/>
+              </a:spcBef>
+              <a:spcAft>
+                <a:spcPts val="0"/>
+              </a:spcAft>
+              <a:buClr>
+                <a:schemeClr val="lt1"/>
+              </a:buClr>
+              <a:buSzPts val="4800"/>
+              <a:buFont typeface="Montserrat"/>
+              <a:buNone/>
+              <a:defRPr sz="4800" b="1" i="0" u="none" strike="noStrike" cap="none">
+                <a:solidFill>
+                  <a:schemeClr val="lt1"/>
+                </a:solidFill>
+                <a:latin typeface="Montserrat"/>
+                <a:ea typeface="Montserrat"/>
+                <a:cs typeface="Montserrat"/>
+                <a:sym typeface="Montserrat"/>
+              </a:defRPr>
+            </a:lvl6pPr>
+            <a:lvl7pPr marR="0" lvl="6" algn="ctr" rtl="0">
+              <a:lnSpc>
+                <a:spcPct val="100000"/>
+              </a:lnSpc>
+              <a:spcBef>
+                <a:spcPts val="0"/>
+              </a:spcBef>
+              <a:spcAft>
+                <a:spcPts val="0"/>
+              </a:spcAft>
+              <a:buClr>
+                <a:schemeClr val="lt1"/>
+              </a:buClr>
+              <a:buSzPts val="4800"/>
+              <a:buFont typeface="Montserrat"/>
+              <a:buNone/>
+              <a:defRPr sz="4800" b="1" i="0" u="none" strike="noStrike" cap="none">
+                <a:solidFill>
+                  <a:schemeClr val="lt1"/>
+                </a:solidFill>
+                <a:latin typeface="Montserrat"/>
+                <a:ea typeface="Montserrat"/>
+                <a:cs typeface="Montserrat"/>
+                <a:sym typeface="Montserrat"/>
+              </a:defRPr>
+            </a:lvl7pPr>
+            <a:lvl8pPr marR="0" lvl="7" algn="ctr" rtl="0">
+              <a:lnSpc>
+                <a:spcPct val="100000"/>
+              </a:lnSpc>
+              <a:spcBef>
+                <a:spcPts val="0"/>
+              </a:spcBef>
+              <a:spcAft>
+                <a:spcPts val="0"/>
+              </a:spcAft>
+              <a:buClr>
+                <a:schemeClr val="lt1"/>
+              </a:buClr>
+              <a:buSzPts val="4800"/>
+              <a:buFont typeface="Montserrat"/>
+              <a:buNone/>
+              <a:defRPr sz="4800" b="1" i="0" u="none" strike="noStrike" cap="none">
+                <a:solidFill>
+                  <a:schemeClr val="lt1"/>
+                </a:solidFill>
+                <a:latin typeface="Montserrat"/>
+                <a:ea typeface="Montserrat"/>
+                <a:cs typeface="Montserrat"/>
+                <a:sym typeface="Montserrat"/>
+              </a:defRPr>
+            </a:lvl8pPr>
+            <a:lvl9pPr marR="0" lvl="8" algn="ctr" rtl="0">
+              <a:lnSpc>
+                <a:spcPct val="100000"/>
+              </a:lnSpc>
+              <a:spcBef>
+                <a:spcPts val="0"/>
+              </a:spcBef>
+              <a:spcAft>
+                <a:spcPts val="0"/>
+              </a:spcAft>
+              <a:buClr>
+                <a:schemeClr val="lt1"/>
+              </a:buClr>
+              <a:buSzPts val="4800"/>
+              <a:buFont typeface="Montserrat"/>
+              <a:buNone/>
+              <a:defRPr sz="4800" b="1" i="0" u="none" strike="noStrike" cap="none">
+                <a:solidFill>
+                  <a:schemeClr val="lt1"/>
+                </a:solidFill>
+                <a:latin typeface="Montserrat"/>
+                <a:ea typeface="Montserrat"/>
+                <a:cs typeface="Montserrat"/>
+                <a:sym typeface="Montserrat"/>
+              </a:defRPr>
+            </a:lvl9pPr>
+          </a:lstStyle>
+          <a:p>
+            <a:endParaRPr lang="en-US" sz="2000">
+              <a:latin typeface="Arial" panose="020B0604020202020204" pitchFamily="34" charset="0"/>
+              <a:cs typeface="Arial" panose="020B0604020202020204" pitchFamily="34" charset="0"/>
+            </a:endParaRPr>
+          </a:p>
+          <a:p>
+            <a:pPr algn="ctr"/>
+            <a:br>
+              <a:rPr lang="en-US" sz="2000">
+                <a:latin typeface="Arial" panose="020B0604020202020204" pitchFamily="34" charset="0"/>
+                <a:cs typeface="Arial" panose="020B0604020202020204" pitchFamily="34" charset="0"/>
+              </a:rPr>
+            </a:br>
+            <a:r>
+              <a:rPr lang="en-US" sz="2000">
+                <a:latin typeface="Arial" panose="020B0604020202020204" pitchFamily="34" charset="0"/>
+                <a:cs typeface="Arial" panose="020B0604020202020204" pitchFamily="34" charset="0"/>
+              </a:rPr>
+              <a:t>       </a:t>
+            </a:r>
+            <a:r>
+              <a:rPr lang="en-US" sz="2000">
+                <a:solidFill>
+                  <a:schemeClr val="bg1"/>
+                </a:solidFill>
+                <a:latin typeface="Arial" panose="020B0604020202020204" pitchFamily="34" charset="0"/>
+                <a:cs typeface="Arial" panose="020B0604020202020204" pitchFamily="34" charset="0"/>
+              </a:rPr>
+              <a:t>Thành viên nhóm</a:t>
+            </a:r>
+          </a:p>
+          <a:p>
+            <a:r>
+              <a:rPr lang="en-US" sz="2000">
+                <a:solidFill>
+                  <a:schemeClr val="bg1"/>
+                </a:solidFill>
+                <a:latin typeface="Arial" panose="020B0604020202020204" pitchFamily="34" charset="0"/>
+                <a:cs typeface="Arial" panose="020B0604020202020204" pitchFamily="34" charset="0"/>
+              </a:rPr>
+              <a:t>Dương Mỹ Lộc – 2011402</a:t>
+            </a:r>
+          </a:p>
+          <a:p>
+            <a:r>
+              <a:rPr lang="en-US" sz="2000">
+                <a:solidFill>
+                  <a:schemeClr val="bg1"/>
+                </a:solidFill>
+                <a:latin typeface="Arial" panose="020B0604020202020204" pitchFamily="34" charset="0"/>
+                <a:cs typeface="Arial" panose="020B0604020202020204" pitchFamily="34" charset="0"/>
+              </a:rPr>
+              <a:t>Triệu Trọng Hậu - 1111111</a:t>
             </a:r>
           </a:p>
         </p:txBody>
@@ -5225,740 +5467,7 @@
 </p:sld>
 </file>
 
-<file path=ppt/slides/slide10.xml><?xml version="1.0" encoding="utf-8"?>
-<p:sld xmlns:a="http://schemas.openxmlformats.org/drawingml/2006/main" xmlns:r="http://schemas.openxmlformats.org/officeDocument/2006/relationships" xmlns:p="http://schemas.openxmlformats.org/presentationml/2006/main">
-  <p:cSld>
-    <p:spTree>
-      <p:nvGrpSpPr>
-        <p:cNvPr id="1" name="Shape 309"/>
-        <p:cNvGrpSpPr/>
-        <p:nvPr/>
-      </p:nvGrpSpPr>
-      <p:grpSpPr>
-        <a:xfrm>
-          <a:off x="0" y="0"/>
-          <a:ext cx="0" cy="0"/>
-          <a:chOff x="0" y="0"/>
-          <a:chExt cx="0" cy="0"/>
-        </a:xfrm>
-      </p:grpSpPr>
-      <p:pic>
-        <p:nvPicPr>
-          <p:cNvPr id="310" name="Google Shape;310;p35" descr="photo-1434030216411-0b793f4b4173.jpg"/>
-          <p:cNvPicPr preferRelativeResize="0"/>
-          <p:nvPr/>
-        </p:nvPicPr>
-        <p:blipFill rotWithShape="1">
-          <a:blip r:embed="rId3">
-            <a:alphaModFix/>
-          </a:blip>
-          <a:srcRect l="28831" r="30600"/>
-          <a:stretch/>
-        </p:blipFill>
-        <p:spPr>
-          <a:xfrm>
-            <a:off x="0" y="0"/>
-            <a:ext cx="2086625" cy="5143500"/>
-          </a:xfrm>
-          <a:prstGeom prst="rect">
-            <a:avLst/>
-          </a:prstGeom>
-          <a:noFill/>
-          <a:ln>
-            <a:noFill/>
-          </a:ln>
-        </p:spPr>
-      </p:pic>
-      <p:sp>
-        <p:nvSpPr>
-          <p:cNvPr id="311" name="Google Shape;311;p35"/>
-          <p:cNvSpPr txBox="1">
-            <a:spLocks noGrp="1"/>
-          </p:cNvSpPr>
-          <p:nvPr>
-            <p:ph type="sldNum" idx="12"/>
-          </p:nvPr>
-        </p:nvSpPr>
-        <p:spPr>
-          <a:xfrm>
-            <a:off x="109075" y="146024"/>
-            <a:ext cx="1807200" cy="1252800"/>
-          </a:xfrm>
-          <a:prstGeom prst="rect">
-            <a:avLst/>
-          </a:prstGeom>
-        </p:spPr>
-        <p:txBody>
-          <a:bodyPr spcFirstLastPara="1" wrap="square" lIns="91425" tIns="91425" rIns="91425" bIns="91425" anchor="t" anchorCtr="0">
-            <a:noAutofit/>
-          </a:bodyPr>
-          <a:lstStyle/>
-          <a:p>
-            <a:pPr marL="0" lvl="0" indent="0" algn="l" rtl="0">
-              <a:spcBef>
-                <a:spcPts val="0"/>
-              </a:spcBef>
-              <a:spcAft>
-                <a:spcPts val="0"/>
-              </a:spcAft>
-              <a:buNone/>
-            </a:pPr>
-            <a:fld id="{00000000-1234-1234-1234-123412341234}" type="slidenum">
-              <a:rPr lang="en">
-                <a:solidFill>
-                  <a:srgbClr val="073763"/>
-                </a:solidFill>
-              </a:rPr>
-              <a:t>10</a:t>
-            </a:fld>
-            <a:endParaRPr>
-              <a:solidFill>
-                <a:srgbClr val="073763"/>
-              </a:solidFill>
-            </a:endParaRPr>
-          </a:p>
-        </p:txBody>
-      </p:sp>
-      <p:sp>
-        <p:nvSpPr>
-          <p:cNvPr id="312" name="Google Shape;312;p35"/>
-          <p:cNvSpPr txBox="1">
-            <a:spLocks noGrp="1"/>
-          </p:cNvSpPr>
-          <p:nvPr>
-            <p:ph type="ctrTitle" idx="4294967295"/>
-          </p:nvPr>
-        </p:nvSpPr>
-        <p:spPr>
-          <a:xfrm>
-            <a:off x="2691650" y="440350"/>
-            <a:ext cx="5571300" cy="1159800"/>
-          </a:xfrm>
-          <a:prstGeom prst="rect">
-            <a:avLst/>
-          </a:prstGeom>
-        </p:spPr>
-        <p:txBody>
-          <a:bodyPr spcFirstLastPara="1" wrap="square" lIns="91425" tIns="91425" rIns="91425" bIns="91425" anchor="t" anchorCtr="0">
-            <a:noAutofit/>
-          </a:bodyPr>
-          <a:lstStyle/>
-          <a:p>
-            <a:pPr marL="0" lvl="0" indent="0" algn="l" rtl="0">
-              <a:spcBef>
-                <a:spcPts val="0"/>
-              </a:spcBef>
-              <a:spcAft>
-                <a:spcPts val="0"/>
-              </a:spcAft>
-              <a:buNone/>
-            </a:pPr>
-            <a:r>
-              <a:rPr lang="en" sz="9000">
-                <a:solidFill>
-                  <a:schemeClr val="accent3"/>
-                </a:solidFill>
-              </a:rPr>
-              <a:t>THANKS!</a:t>
-            </a:r>
-            <a:endParaRPr sz="9000">
-              <a:solidFill>
-                <a:schemeClr val="accent3"/>
-              </a:solidFill>
-            </a:endParaRPr>
-          </a:p>
-        </p:txBody>
-      </p:sp>
-      <p:sp>
-        <p:nvSpPr>
-          <p:cNvPr id="313" name="Google Shape;313;p35"/>
-          <p:cNvSpPr txBox="1">
-            <a:spLocks noGrp="1"/>
-          </p:cNvSpPr>
-          <p:nvPr>
-            <p:ph type="subTitle" idx="4294967295"/>
-          </p:nvPr>
-        </p:nvSpPr>
-        <p:spPr>
-          <a:xfrm>
-            <a:off x="2796050" y="1927875"/>
-            <a:ext cx="5571300" cy="643875"/>
-          </a:xfrm>
-          <a:prstGeom prst="rect">
-            <a:avLst/>
-          </a:prstGeom>
-        </p:spPr>
-        <p:txBody>
-          <a:bodyPr spcFirstLastPara="1" wrap="square" lIns="91425" tIns="91425" rIns="91425" bIns="91425" anchor="t" anchorCtr="0">
-            <a:noAutofit/>
-          </a:bodyPr>
-          <a:lstStyle/>
-          <a:p>
-            <a:pPr marL="0" lvl="0" indent="0" algn="l" rtl="0">
-              <a:spcBef>
-                <a:spcPts val="600"/>
-              </a:spcBef>
-              <a:spcAft>
-                <a:spcPts val="0"/>
-              </a:spcAft>
-              <a:buNone/>
-            </a:pPr>
-            <a:r>
-              <a:rPr lang="en" sz="2400" b="1"/>
-              <a:t>Any questions?</a:t>
-            </a:r>
-            <a:endParaRPr sz="2400"/>
-          </a:p>
-        </p:txBody>
-      </p:sp>
-    </p:spTree>
-  </p:cSld>
-  <p:clrMapOvr>
-    <a:masterClrMapping/>
-  </p:clrMapOvr>
-</p:sld>
-</file>
-
 <file path=ppt/slides/slide2.xml><?xml version="1.0" encoding="utf-8"?>
-<p:sld xmlns:a="http://schemas.openxmlformats.org/drawingml/2006/main" xmlns:r="http://schemas.openxmlformats.org/officeDocument/2006/relationships" xmlns:p="http://schemas.openxmlformats.org/presentationml/2006/main">
-  <p:cSld>
-    <p:spTree>
-      <p:nvGrpSpPr>
-        <p:cNvPr id="1" name="Shape 74"/>
-        <p:cNvGrpSpPr/>
-        <p:nvPr/>
-      </p:nvGrpSpPr>
-      <p:grpSpPr>
-        <a:xfrm>
-          <a:off x="0" y="0"/>
-          <a:ext cx="0" cy="0"/>
-          <a:chOff x="0" y="0"/>
-          <a:chExt cx="0" cy="0"/>
-        </a:xfrm>
-      </p:grpSpPr>
-      <p:sp>
-        <p:nvSpPr>
-          <p:cNvPr id="75" name="Google Shape;75;p15"/>
-          <p:cNvSpPr txBox="1">
-            <a:spLocks noGrp="1"/>
-          </p:cNvSpPr>
-          <p:nvPr>
-            <p:ph type="ctrTitle" idx="4294967295"/>
-          </p:nvPr>
-        </p:nvSpPr>
-        <p:spPr>
-          <a:xfrm>
-            <a:off x="3862857" y="611800"/>
-            <a:ext cx="3437688" cy="709794"/>
-          </a:xfrm>
-          <a:prstGeom prst="rect">
-            <a:avLst/>
-          </a:prstGeom>
-        </p:spPr>
-        <p:txBody>
-          <a:bodyPr spcFirstLastPara="1" wrap="square" lIns="91425" tIns="91425" rIns="91425" bIns="91425" anchor="t" anchorCtr="0">
-            <a:noAutofit/>
-          </a:bodyPr>
-          <a:lstStyle/>
-          <a:p>
-            <a:pPr marL="0" lvl="0" indent="0" algn="l" rtl="0">
-              <a:spcBef>
-                <a:spcPts val="0"/>
-              </a:spcBef>
-              <a:spcAft>
-                <a:spcPts val="0"/>
-              </a:spcAft>
-              <a:buNone/>
-            </a:pPr>
-            <a:r>
-              <a:rPr lang="en-US" sz="4000">
-                <a:solidFill>
-                  <a:schemeClr val="accent3"/>
-                </a:solidFill>
-              </a:rPr>
-              <a:t>Xin Chào !!</a:t>
-            </a:r>
-            <a:endParaRPr sz="4000">
-              <a:solidFill>
-                <a:schemeClr val="accent3"/>
-              </a:solidFill>
-            </a:endParaRPr>
-          </a:p>
-        </p:txBody>
-      </p:sp>
-      <p:pic>
-        <p:nvPicPr>
-          <p:cNvPr id="77" name="Google Shape;77;p15" descr="photo-1434030216411-0b793f4b4173.jpg"/>
-          <p:cNvPicPr preferRelativeResize="0"/>
-          <p:nvPr/>
-        </p:nvPicPr>
-        <p:blipFill rotWithShape="1">
-          <a:blip r:embed="rId3">
-            <a:alphaModFix/>
-          </a:blip>
-          <a:srcRect l="28831" r="30600"/>
-          <a:stretch/>
-        </p:blipFill>
-        <p:spPr>
-          <a:xfrm>
-            <a:off x="0" y="0"/>
-            <a:ext cx="2086625" cy="5143500"/>
-          </a:xfrm>
-          <a:prstGeom prst="rect">
-            <a:avLst/>
-          </a:prstGeom>
-          <a:noFill/>
-          <a:ln>
-            <a:noFill/>
-          </a:ln>
-        </p:spPr>
-      </p:pic>
-      <p:sp>
-        <p:nvSpPr>
-          <p:cNvPr id="78" name="Google Shape;78;p15"/>
-          <p:cNvSpPr txBox="1">
-            <a:spLocks noGrp="1"/>
-          </p:cNvSpPr>
-          <p:nvPr>
-            <p:ph type="sldNum" idx="12"/>
-          </p:nvPr>
-        </p:nvSpPr>
-        <p:spPr>
-          <a:xfrm>
-            <a:off x="109075" y="146024"/>
-            <a:ext cx="1807200" cy="1252800"/>
-          </a:xfrm>
-          <a:prstGeom prst="rect">
-            <a:avLst/>
-          </a:prstGeom>
-        </p:spPr>
-        <p:txBody>
-          <a:bodyPr spcFirstLastPara="1" wrap="square" lIns="91425" tIns="91425" rIns="91425" bIns="91425" anchor="t" anchorCtr="0">
-            <a:noAutofit/>
-          </a:bodyPr>
-          <a:lstStyle/>
-          <a:p>
-            <a:pPr marL="0" lvl="0" indent="0" algn="l" rtl="0">
-              <a:spcBef>
-                <a:spcPts val="0"/>
-              </a:spcBef>
-              <a:spcAft>
-                <a:spcPts val="0"/>
-              </a:spcAft>
-              <a:buNone/>
-            </a:pPr>
-            <a:fld id="{00000000-1234-1234-1234-123412341234}" type="slidenum">
-              <a:rPr lang="en">
-                <a:solidFill>
-                  <a:srgbClr val="FFFFFF"/>
-                </a:solidFill>
-              </a:rPr>
-              <a:t>2</a:t>
-            </a:fld>
-            <a:endParaRPr>
-              <a:solidFill>
-                <a:srgbClr val="FFFFFF"/>
-              </a:solidFill>
-            </a:endParaRPr>
-          </a:p>
-        </p:txBody>
-      </p:sp>
-      <p:pic>
-        <p:nvPicPr>
-          <p:cNvPr id="6" name="Google Shape;515;p45">
-            <a:extLst>
-              <a:ext uri="{FF2B5EF4-FFF2-40B4-BE49-F238E27FC236}">
-                <a16:creationId xmlns:a16="http://schemas.microsoft.com/office/drawing/2014/main" id="{87A8312A-5B52-E58C-696E-90BF27EEE8F9}"/>
-              </a:ext>
-            </a:extLst>
-          </p:cNvPr>
-          <p:cNvPicPr preferRelativeResize="0"/>
-          <p:nvPr/>
-        </p:nvPicPr>
-        <p:blipFill>
-          <a:blip r:embed="rId4"/>
-          <a:srcRect l="185" r="185"/>
-          <a:stretch/>
-        </p:blipFill>
-        <p:spPr>
-          <a:xfrm>
-            <a:off x="2982526" y="1827150"/>
-            <a:ext cx="1489200" cy="1489200"/>
-          </a:xfrm>
-          <a:prstGeom prst="ellipse">
-            <a:avLst/>
-          </a:prstGeom>
-          <a:noFill/>
-          <a:ln>
-            <a:noFill/>
-          </a:ln>
-        </p:spPr>
-      </p:pic>
-      <p:sp>
-        <p:nvSpPr>
-          <p:cNvPr id="7" name="Google Shape;516;p45">
-            <a:extLst>
-              <a:ext uri="{FF2B5EF4-FFF2-40B4-BE49-F238E27FC236}">
-                <a16:creationId xmlns:a16="http://schemas.microsoft.com/office/drawing/2014/main" id="{5D587073-B196-54D5-F81C-99BAFE46FC0D}"/>
-              </a:ext>
-            </a:extLst>
-          </p:cNvPr>
-          <p:cNvSpPr txBox="1"/>
-          <p:nvPr/>
-        </p:nvSpPr>
-        <p:spPr>
-          <a:xfrm>
-            <a:off x="2987551" y="3446175"/>
-            <a:ext cx="1489200" cy="384056"/>
-          </a:xfrm>
-          <a:prstGeom prst="rect">
-            <a:avLst/>
-          </a:prstGeom>
-          <a:noFill/>
-          <a:ln>
-            <a:noFill/>
-          </a:ln>
-        </p:spPr>
-        <p:txBody>
-          <a:bodyPr spcFirstLastPara="1" wrap="square" lIns="0" tIns="0" rIns="0" bIns="0" anchor="t" anchorCtr="0">
-            <a:noAutofit/>
-          </a:bodyPr>
-          <a:lstStyle/>
-          <a:p>
-            <a:pPr marL="0" lvl="0" indent="0" algn="ctr" rtl="0">
-              <a:spcBef>
-                <a:spcPts val="0"/>
-              </a:spcBef>
-              <a:spcAft>
-                <a:spcPts val="0"/>
-              </a:spcAft>
-              <a:buNone/>
-            </a:pPr>
-            <a:r>
-              <a:rPr lang="en" sz="1200" b="1">
-                <a:solidFill>
-                  <a:schemeClr val="dk1"/>
-                </a:solidFill>
-                <a:latin typeface="Roboto"/>
-                <a:ea typeface="Roboto"/>
-                <a:cs typeface="Roboto"/>
-                <a:sym typeface="Roboto"/>
-              </a:rPr>
-              <a:t>Triệu Trọng Hậu</a:t>
-            </a:r>
-            <a:br>
-              <a:rPr lang="en">
-                <a:latin typeface="Roboto"/>
-                <a:ea typeface="Roboto"/>
-                <a:cs typeface="Roboto"/>
-                <a:sym typeface="Roboto"/>
-              </a:rPr>
-            </a:br>
-            <a:r>
-              <a:rPr lang="en-US" sz="800">
-                <a:solidFill>
-                  <a:schemeClr val="dk2"/>
-                </a:solidFill>
-                <a:latin typeface="Roboto"/>
-                <a:ea typeface="Roboto"/>
-                <a:cs typeface="Roboto"/>
-                <a:sym typeface="Roboto"/>
-              </a:rPr>
-              <a:t>2011379</a:t>
-            </a:r>
-          </a:p>
-          <a:p>
-            <a:pPr marL="0" lvl="0" indent="0" algn="ctr" rtl="0">
-              <a:spcBef>
-                <a:spcPts val="400"/>
-              </a:spcBef>
-              <a:spcAft>
-                <a:spcPts val="400"/>
-              </a:spcAft>
-              <a:buNone/>
-            </a:pPr>
-            <a:endParaRPr lang="en-US">
-              <a:latin typeface="Roboto"/>
-              <a:ea typeface="Roboto"/>
-              <a:cs typeface="Roboto"/>
-              <a:sym typeface="Roboto"/>
-            </a:endParaRPr>
-          </a:p>
-        </p:txBody>
-      </p:sp>
-      <p:pic>
-        <p:nvPicPr>
-          <p:cNvPr id="8" name="Google Shape;515;p45">
-            <a:extLst>
-              <a:ext uri="{FF2B5EF4-FFF2-40B4-BE49-F238E27FC236}">
-                <a16:creationId xmlns:a16="http://schemas.microsoft.com/office/drawing/2014/main" id="{B6C85885-9454-95FB-3FA7-300918C87931}"/>
-              </a:ext>
-            </a:extLst>
-          </p:cNvPr>
-          <p:cNvPicPr preferRelativeResize="0"/>
-          <p:nvPr/>
-        </p:nvPicPr>
-        <p:blipFill>
-          <a:blip r:embed="rId5"/>
-          <a:srcRect l="16699" r="16699"/>
-          <a:stretch/>
-        </p:blipFill>
-        <p:spPr>
-          <a:xfrm>
-            <a:off x="4876288" y="1827150"/>
-            <a:ext cx="1489200" cy="1489200"/>
-          </a:xfrm>
-          <a:prstGeom prst="ellipse">
-            <a:avLst/>
-          </a:prstGeom>
-          <a:noFill/>
-          <a:ln>
-            <a:noFill/>
-          </a:ln>
-        </p:spPr>
-      </p:pic>
-      <p:sp>
-        <p:nvSpPr>
-          <p:cNvPr id="9" name="Google Shape;516;p45">
-            <a:extLst>
-              <a:ext uri="{FF2B5EF4-FFF2-40B4-BE49-F238E27FC236}">
-                <a16:creationId xmlns:a16="http://schemas.microsoft.com/office/drawing/2014/main" id="{9EDF89C7-ACB1-5E78-8C71-8ECB5D39B231}"/>
-              </a:ext>
-            </a:extLst>
-          </p:cNvPr>
-          <p:cNvSpPr txBox="1"/>
-          <p:nvPr/>
-        </p:nvSpPr>
-        <p:spPr>
-          <a:xfrm>
-            <a:off x="4881313" y="3446175"/>
-            <a:ext cx="1489200" cy="384056"/>
-          </a:xfrm>
-          <a:prstGeom prst="rect">
-            <a:avLst/>
-          </a:prstGeom>
-          <a:noFill/>
-          <a:ln>
-            <a:noFill/>
-          </a:ln>
-        </p:spPr>
-        <p:txBody>
-          <a:bodyPr spcFirstLastPara="1" wrap="square" lIns="0" tIns="0" rIns="0" bIns="0" anchor="t" anchorCtr="0">
-            <a:noAutofit/>
-          </a:bodyPr>
-          <a:lstStyle/>
-          <a:p>
-            <a:pPr marL="0" lvl="0" indent="0" algn="ctr" rtl="0">
-              <a:spcBef>
-                <a:spcPts val="0"/>
-              </a:spcBef>
-              <a:spcAft>
-                <a:spcPts val="0"/>
-              </a:spcAft>
-              <a:buNone/>
-            </a:pPr>
-            <a:r>
-              <a:rPr lang="en" sz="1200" b="1">
-                <a:solidFill>
-                  <a:schemeClr val="dk1"/>
-                </a:solidFill>
-                <a:latin typeface="Roboto"/>
-                <a:ea typeface="Roboto"/>
-                <a:cs typeface="Roboto"/>
-                <a:sym typeface="Roboto"/>
-              </a:rPr>
-              <a:t>Dương Mỹ Lộc</a:t>
-            </a:r>
-            <a:br>
-              <a:rPr lang="en">
-                <a:latin typeface="Roboto"/>
-                <a:ea typeface="Roboto"/>
-                <a:cs typeface="Roboto"/>
-                <a:sym typeface="Roboto"/>
-              </a:rPr>
-            </a:br>
-            <a:r>
-              <a:rPr lang="en" sz="800">
-                <a:solidFill>
-                  <a:schemeClr val="dk2"/>
-                </a:solidFill>
-                <a:latin typeface="Roboto"/>
-                <a:ea typeface="Roboto"/>
-                <a:cs typeface="Roboto"/>
-                <a:sym typeface="Roboto"/>
-              </a:rPr>
-              <a:t>2011402</a:t>
-            </a:r>
-            <a:endParaRPr sz="800">
-              <a:solidFill>
-                <a:schemeClr val="dk2"/>
-              </a:solidFill>
-              <a:latin typeface="Roboto"/>
-              <a:ea typeface="Roboto"/>
-              <a:cs typeface="Roboto"/>
-              <a:sym typeface="Roboto"/>
-            </a:endParaRPr>
-          </a:p>
-          <a:p>
-            <a:pPr marL="0" lvl="0" indent="0" algn="ctr" rtl="0">
-              <a:spcBef>
-                <a:spcPts val="400"/>
-              </a:spcBef>
-              <a:spcAft>
-                <a:spcPts val="400"/>
-              </a:spcAft>
-              <a:buNone/>
-            </a:pPr>
-            <a:endParaRPr>
-              <a:latin typeface="Roboto"/>
-              <a:ea typeface="Roboto"/>
-              <a:cs typeface="Roboto"/>
-              <a:sym typeface="Roboto"/>
-            </a:endParaRPr>
-          </a:p>
-        </p:txBody>
-      </p:sp>
-      <p:pic>
-        <p:nvPicPr>
-          <p:cNvPr id="10" name="Google Shape;515;p45">
-            <a:extLst>
-              <a:ext uri="{FF2B5EF4-FFF2-40B4-BE49-F238E27FC236}">
-                <a16:creationId xmlns:a16="http://schemas.microsoft.com/office/drawing/2014/main" id="{B8C69DEF-24BD-6C2B-D353-99EB94EDC5A0}"/>
-              </a:ext>
-            </a:extLst>
-          </p:cNvPr>
-          <p:cNvPicPr preferRelativeResize="0"/>
-          <p:nvPr/>
-        </p:nvPicPr>
-        <p:blipFill>
-          <a:blip r:embed="rId6"/>
-          <a:srcRect l="300" r="300"/>
-          <a:stretch/>
-        </p:blipFill>
-        <p:spPr>
-          <a:xfrm>
-            <a:off x="6776932" y="1805157"/>
-            <a:ext cx="1489200" cy="1489200"/>
-          </a:xfrm>
-          <a:prstGeom prst="ellipse">
-            <a:avLst/>
-          </a:prstGeom>
-          <a:noFill/>
-          <a:ln>
-            <a:noFill/>
-          </a:ln>
-        </p:spPr>
-      </p:pic>
-      <p:sp>
-        <p:nvSpPr>
-          <p:cNvPr id="11" name="Google Shape;516;p45">
-            <a:extLst>
-              <a:ext uri="{FF2B5EF4-FFF2-40B4-BE49-F238E27FC236}">
-                <a16:creationId xmlns:a16="http://schemas.microsoft.com/office/drawing/2014/main" id="{C3DEF929-E7CD-69C4-AD33-47CFC2BA55B2}"/>
-              </a:ext>
-            </a:extLst>
-          </p:cNvPr>
-          <p:cNvSpPr txBox="1"/>
-          <p:nvPr/>
-        </p:nvSpPr>
-        <p:spPr>
-          <a:xfrm>
-            <a:off x="6774813" y="3424182"/>
-            <a:ext cx="1489200" cy="384056"/>
-          </a:xfrm>
-          <a:prstGeom prst="rect">
-            <a:avLst/>
-          </a:prstGeom>
-          <a:noFill/>
-          <a:ln>
-            <a:noFill/>
-          </a:ln>
-        </p:spPr>
-        <p:txBody>
-          <a:bodyPr spcFirstLastPara="1" wrap="square" lIns="0" tIns="0" rIns="0" bIns="0" anchor="t" anchorCtr="0">
-            <a:noAutofit/>
-          </a:bodyPr>
-          <a:lstStyle/>
-          <a:p>
-            <a:pPr marL="0" lvl="0" indent="0" algn="ctr" rtl="0">
-              <a:spcBef>
-                <a:spcPts val="0"/>
-              </a:spcBef>
-              <a:spcAft>
-                <a:spcPts val="0"/>
-              </a:spcAft>
-              <a:buNone/>
-            </a:pPr>
-            <a:r>
-              <a:rPr lang="en" sz="1200" b="1">
-                <a:solidFill>
-                  <a:schemeClr val="dk1"/>
-                </a:solidFill>
-                <a:latin typeface="Roboto"/>
-                <a:ea typeface="Roboto"/>
-                <a:cs typeface="Roboto"/>
-                <a:sym typeface="Roboto"/>
-              </a:rPr>
-              <a:t>Hoàng Anh Minh</a:t>
-            </a:r>
-            <a:br>
-              <a:rPr lang="en">
-                <a:latin typeface="Roboto"/>
-                <a:ea typeface="Roboto"/>
-                <a:cs typeface="Roboto"/>
-                <a:sym typeface="Roboto"/>
-              </a:rPr>
-            </a:br>
-            <a:r>
-              <a:rPr lang="en" sz="800">
-                <a:solidFill>
-                  <a:schemeClr val="dk2"/>
-                </a:solidFill>
-                <a:latin typeface="Roboto"/>
-                <a:ea typeface="Roboto"/>
-                <a:cs typeface="Roboto"/>
-                <a:sym typeface="Roboto"/>
-              </a:rPr>
-              <a:t>1710218</a:t>
-            </a:r>
-            <a:endParaRPr sz="800">
-              <a:solidFill>
-                <a:schemeClr val="dk2"/>
-              </a:solidFill>
-              <a:latin typeface="Roboto"/>
-              <a:ea typeface="Roboto"/>
-              <a:cs typeface="Roboto"/>
-              <a:sym typeface="Roboto"/>
-            </a:endParaRPr>
-          </a:p>
-          <a:p>
-            <a:pPr marL="0" lvl="0" indent="0" algn="ctr" rtl="0">
-              <a:spcBef>
-                <a:spcPts val="400"/>
-              </a:spcBef>
-              <a:spcAft>
-                <a:spcPts val="400"/>
-              </a:spcAft>
-              <a:buNone/>
-            </a:pPr>
-            <a:endParaRPr>
-              <a:latin typeface="Roboto"/>
-              <a:ea typeface="Roboto"/>
-              <a:cs typeface="Roboto"/>
-              <a:sym typeface="Roboto"/>
-            </a:endParaRPr>
-          </a:p>
-        </p:txBody>
-      </p:sp>
-    </p:spTree>
-  </p:cSld>
-  <p:clrMapOvr>
-    <a:masterClrMapping/>
-  </p:clrMapOvr>
-</p:sld>
-</file>
-
-<file path=ppt/slides/slide3.xml><?xml version="1.0" encoding="utf-8"?>
 <p:sld xmlns:a="http://schemas.openxmlformats.org/drawingml/2006/main" xmlns:r="http://schemas.openxmlformats.org/officeDocument/2006/relationships" xmlns:p="http://schemas.openxmlformats.org/presentationml/2006/main">
   <p:cSld>
     <p:spTree>
@@ -6053,12 +5562,157 @@
             </a:pPr>
             <a:fld id="{00000000-1234-1234-1234-123412341234}" type="slidenum">
               <a:rPr lang="en"/>
+              <a:t>2</a:t>
+            </a:fld>
+            <a:endParaRPr/>
+          </a:p>
+        </p:txBody>
+      </p:sp>
+    </p:spTree>
+  </p:cSld>
+  <p:clrMapOvr>
+    <a:masterClrMapping/>
+  </p:clrMapOvr>
+</p:sld>
+</file>
+
+<file path=ppt/slides/slide3.xml><?xml version="1.0" encoding="utf-8"?>
+<p:sld xmlns:a="http://schemas.openxmlformats.org/drawingml/2006/main" xmlns:r="http://schemas.openxmlformats.org/officeDocument/2006/relationships" xmlns:p="http://schemas.openxmlformats.org/presentationml/2006/main">
+  <p:cSld>
+    <p:spTree>
+      <p:nvGrpSpPr>
+        <p:cNvPr id="1" name="Shape 95"/>
+        <p:cNvGrpSpPr/>
+        <p:nvPr/>
+      </p:nvGrpSpPr>
+      <p:grpSpPr>
+        <a:xfrm>
+          <a:off x="0" y="0"/>
+          <a:ext cx="0" cy="0"/>
+          <a:chOff x="0" y="0"/>
+          <a:chExt cx="0" cy="0"/>
+        </a:xfrm>
+      </p:grpSpPr>
+      <p:sp>
+        <p:nvSpPr>
+          <p:cNvPr id="96" name="Google Shape;96;p18"/>
+          <p:cNvSpPr txBox="1">
+            <a:spLocks noGrp="1"/>
+          </p:cNvSpPr>
+          <p:nvPr>
+            <p:ph type="title"/>
+          </p:nvPr>
+        </p:nvSpPr>
+        <p:spPr>
+          <a:xfrm>
+            <a:off x="0" y="1569600"/>
+            <a:ext cx="1939250" cy="857400"/>
+          </a:xfrm>
+          <a:prstGeom prst="rect">
+            <a:avLst/>
+          </a:prstGeom>
+        </p:spPr>
+        <p:txBody>
+          <a:bodyPr spcFirstLastPara="1" wrap="square" lIns="91425" tIns="91425" rIns="91425" bIns="91425" anchor="t" anchorCtr="0">
+            <a:noAutofit/>
+          </a:bodyPr>
+          <a:lstStyle/>
+          <a:p>
+            <a:pPr marL="0" lvl="0" indent="0" algn="l" rtl="0">
+              <a:spcBef>
+                <a:spcPts val="0"/>
+              </a:spcBef>
+              <a:spcAft>
+                <a:spcPts val="0"/>
+              </a:spcAft>
+              <a:buNone/>
+            </a:pPr>
+            <a:r>
+              <a:rPr lang="en-US"/>
+              <a:t>Mô hình</a:t>
+            </a:r>
+            <a:br>
+              <a:rPr lang="en-US"/>
+            </a:br>
+            <a:r>
+              <a:rPr lang="en-US"/>
+              <a:t>Client – Server</a:t>
+            </a:r>
+          </a:p>
+        </p:txBody>
+      </p:sp>
+      <p:sp>
+        <p:nvSpPr>
+          <p:cNvPr id="98" name="Google Shape;98;p18"/>
+          <p:cNvSpPr txBox="1">
+            <a:spLocks noGrp="1"/>
+          </p:cNvSpPr>
+          <p:nvPr>
+            <p:ph type="sldNum" idx="12"/>
+          </p:nvPr>
+        </p:nvSpPr>
+        <p:spPr>
+          <a:xfrm>
+            <a:off x="109075" y="146024"/>
+            <a:ext cx="1807200" cy="1252800"/>
+          </a:xfrm>
+          <a:prstGeom prst="rect">
+            <a:avLst/>
+          </a:prstGeom>
+        </p:spPr>
+        <p:txBody>
+          <a:bodyPr spcFirstLastPara="1" wrap="square" lIns="91425" tIns="91425" rIns="91425" bIns="91425" anchor="t" anchorCtr="0">
+            <a:noAutofit/>
+          </a:bodyPr>
+          <a:lstStyle/>
+          <a:p>
+            <a:pPr marL="0" lvl="0" indent="0" algn="l" rtl="0">
+              <a:spcBef>
+                <a:spcPts val="0"/>
+              </a:spcBef>
+              <a:spcAft>
+                <a:spcPts val="0"/>
+              </a:spcAft>
+              <a:buNone/>
+            </a:pPr>
+            <a:fld id="{00000000-1234-1234-1234-123412341234}" type="slidenum">
+              <a:rPr lang="en"/>
               <a:t>3</a:t>
             </a:fld>
             <a:endParaRPr/>
           </a:p>
         </p:txBody>
       </p:sp>
+      <p:pic>
+        <p:nvPicPr>
+          <p:cNvPr id="5" name="Picture 4">
+            <a:extLst>
+              <a:ext uri="{FF2B5EF4-FFF2-40B4-BE49-F238E27FC236}">
+                <a16:creationId xmlns:a16="http://schemas.microsoft.com/office/drawing/2014/main" id="{13950553-51E8-1181-7F80-7A4047F83B23}"/>
+              </a:ext>
+            </a:extLst>
+          </p:cNvPr>
+          <p:cNvPicPr>
+            <a:picLocks noChangeAspect="1"/>
+          </p:cNvPicPr>
+          <p:nvPr/>
+        </p:nvPicPr>
+        <p:blipFill>
+          <a:blip r:embed="rId3"/>
+          <a:stretch>
+            <a:fillRect/>
+          </a:stretch>
+        </p:blipFill>
+        <p:spPr>
+          <a:xfrm>
+            <a:off x="2364582" y="677972"/>
+            <a:ext cx="6189508" cy="3612356"/>
+          </a:xfrm>
+          <a:prstGeom prst="rect">
+            <a:avLst/>
+          </a:prstGeom>
+        </p:spPr>
+      </p:pic>
     </p:spTree>
   </p:cSld>
   <p:clrMapOvr>
@@ -6127,151 +5781,6 @@
             </a:br>
             <a:r>
               <a:rPr lang="en-US"/>
-              <a:t>Client – Server</a:t>
-            </a:r>
-          </a:p>
-        </p:txBody>
-      </p:sp>
-      <p:sp>
-        <p:nvSpPr>
-          <p:cNvPr id="98" name="Google Shape;98;p18"/>
-          <p:cNvSpPr txBox="1">
-            <a:spLocks noGrp="1"/>
-          </p:cNvSpPr>
-          <p:nvPr>
-            <p:ph type="sldNum" idx="12"/>
-          </p:nvPr>
-        </p:nvSpPr>
-        <p:spPr>
-          <a:xfrm>
-            <a:off x="109075" y="146024"/>
-            <a:ext cx="1807200" cy="1252800"/>
-          </a:xfrm>
-          <a:prstGeom prst="rect">
-            <a:avLst/>
-          </a:prstGeom>
-        </p:spPr>
-        <p:txBody>
-          <a:bodyPr spcFirstLastPara="1" wrap="square" lIns="91425" tIns="91425" rIns="91425" bIns="91425" anchor="t" anchorCtr="0">
-            <a:noAutofit/>
-          </a:bodyPr>
-          <a:lstStyle/>
-          <a:p>
-            <a:pPr marL="0" lvl="0" indent="0" algn="l" rtl="0">
-              <a:spcBef>
-                <a:spcPts val="0"/>
-              </a:spcBef>
-              <a:spcAft>
-                <a:spcPts val="0"/>
-              </a:spcAft>
-              <a:buNone/>
-            </a:pPr>
-            <a:fld id="{00000000-1234-1234-1234-123412341234}" type="slidenum">
-              <a:rPr lang="en"/>
-              <a:t>4</a:t>
-            </a:fld>
-            <a:endParaRPr/>
-          </a:p>
-        </p:txBody>
-      </p:sp>
-      <p:pic>
-        <p:nvPicPr>
-          <p:cNvPr id="5" name="Picture 4">
-            <a:extLst>
-              <a:ext uri="{FF2B5EF4-FFF2-40B4-BE49-F238E27FC236}">
-                <a16:creationId xmlns:a16="http://schemas.microsoft.com/office/drawing/2014/main" id="{13950553-51E8-1181-7F80-7A4047F83B23}"/>
-              </a:ext>
-            </a:extLst>
-          </p:cNvPr>
-          <p:cNvPicPr>
-            <a:picLocks noChangeAspect="1"/>
-          </p:cNvPicPr>
-          <p:nvPr/>
-        </p:nvPicPr>
-        <p:blipFill>
-          <a:blip r:embed="rId3"/>
-          <a:stretch>
-            <a:fillRect/>
-          </a:stretch>
-        </p:blipFill>
-        <p:spPr>
-          <a:xfrm>
-            <a:off x="2364582" y="677972"/>
-            <a:ext cx="6189508" cy="3612356"/>
-          </a:xfrm>
-          <a:prstGeom prst="rect">
-            <a:avLst/>
-          </a:prstGeom>
-        </p:spPr>
-      </p:pic>
-    </p:spTree>
-  </p:cSld>
-  <p:clrMapOvr>
-    <a:masterClrMapping/>
-  </p:clrMapOvr>
-</p:sld>
-</file>
-
-<file path=ppt/slides/slide5.xml><?xml version="1.0" encoding="utf-8"?>
-<p:sld xmlns:a="http://schemas.openxmlformats.org/drawingml/2006/main" xmlns:r="http://schemas.openxmlformats.org/officeDocument/2006/relationships" xmlns:p="http://schemas.openxmlformats.org/presentationml/2006/main">
-  <p:cSld>
-    <p:spTree>
-      <p:nvGrpSpPr>
-        <p:cNvPr id="1" name="Shape 95"/>
-        <p:cNvGrpSpPr/>
-        <p:nvPr/>
-      </p:nvGrpSpPr>
-      <p:grpSpPr>
-        <a:xfrm>
-          <a:off x="0" y="0"/>
-          <a:ext cx="0" cy="0"/>
-          <a:chOff x="0" y="0"/>
-          <a:chExt cx="0" cy="0"/>
-        </a:xfrm>
-      </p:grpSpPr>
-      <p:sp>
-        <p:nvSpPr>
-          <p:cNvPr id="96" name="Google Shape;96;p18"/>
-          <p:cNvSpPr txBox="1">
-            <a:spLocks noGrp="1"/>
-          </p:cNvSpPr>
-          <p:nvPr>
-            <p:ph type="title"/>
-          </p:nvPr>
-        </p:nvSpPr>
-        <p:spPr>
-          <a:xfrm>
-            <a:off x="0" y="1569600"/>
-            <a:ext cx="1939250" cy="857400"/>
-          </a:xfrm>
-          <a:prstGeom prst="rect">
-            <a:avLst/>
-          </a:prstGeom>
-        </p:spPr>
-        <p:txBody>
-          <a:bodyPr spcFirstLastPara="1" wrap="square" lIns="91425" tIns="91425" rIns="91425" bIns="91425" anchor="t" anchorCtr="0">
-            <a:noAutofit/>
-          </a:bodyPr>
-          <a:lstStyle/>
-          <a:p>
-            <a:pPr marL="0" lvl="0" indent="0" algn="l" rtl="0">
-              <a:spcBef>
-                <a:spcPts val="0"/>
-              </a:spcBef>
-              <a:spcAft>
-                <a:spcPts val="0"/>
-              </a:spcAft>
-              <a:buNone/>
-            </a:pPr>
-            <a:r>
-              <a:rPr lang="en-US"/>
-              <a:t>Mô hình</a:t>
-            </a:r>
-            <a:br>
-              <a:rPr lang="en-US"/>
-            </a:br>
-            <a:r>
-              <a:rPr lang="en-US"/>
               <a:t>Peer to Peer</a:t>
             </a:r>
           </a:p>
@@ -6313,7 +5822,7 @@
             </a:pPr>
             <a:fld id="{00000000-1234-1234-1234-123412341234}" type="slidenum">
               <a:rPr lang="en"/>
-              <a:t>5</a:t>
+              <a:t>4</a:t>
             </a:fld>
             <a:endParaRPr/>
           </a:p>
@@ -6379,7 +5888,7 @@
 </p:sld>
 </file>
 
-<file path=ppt/slides/slide6.xml><?xml version="1.0" encoding="utf-8"?>
+<file path=ppt/slides/slide5.xml><?xml version="1.0" encoding="utf-8"?>
 <p:sld xmlns:a="http://schemas.openxmlformats.org/drawingml/2006/main" xmlns:r="http://schemas.openxmlformats.org/officeDocument/2006/relationships" xmlns:p="http://schemas.openxmlformats.org/presentationml/2006/main">
   <p:cSld>
     <p:spTree>
@@ -6474,7 +5983,7 @@
             </a:pPr>
             <a:fld id="{00000000-1234-1234-1234-123412341234}" type="slidenum">
               <a:rPr lang="en"/>
-              <a:t>6</a:t>
+              <a:t>5</a:t>
             </a:fld>
             <a:endParaRPr/>
           </a:p>
@@ -6493,7 +6002,7 @@
 </p:sld>
 </file>
 
-<file path=ppt/slides/slide7.xml><?xml version="1.0" encoding="utf-8"?>
+<file path=ppt/slides/slide6.xml><?xml version="1.0" encoding="utf-8"?>
 <p:sld xmlns:a="http://schemas.openxmlformats.org/drawingml/2006/main" xmlns:r="http://schemas.openxmlformats.org/officeDocument/2006/relationships" xmlns:p="http://schemas.openxmlformats.org/presentationml/2006/main">
   <p:cSld>
     <p:spTree>
@@ -6546,7 +6055,7 @@
             </a:pPr>
             <a:fld id="{00000000-1234-1234-1234-123412341234}" type="slidenum">
               <a:rPr lang="en"/>
-              <a:t>7</a:t>
+              <a:t>6</a:t>
             </a:fld>
             <a:endParaRPr/>
           </a:p>
@@ -8536,7 +8045,7 @@
 </p:sld>
 </file>
 
-<file path=ppt/slides/slide8.xml><?xml version="1.0" encoding="utf-8"?>
+<file path=ppt/slides/slide7.xml><?xml version="1.0" encoding="utf-8"?>
 <p:sld xmlns:a="http://schemas.openxmlformats.org/drawingml/2006/main" xmlns:r="http://schemas.openxmlformats.org/officeDocument/2006/relationships" xmlns:p="http://schemas.openxmlformats.org/presentationml/2006/main">
   <p:cSld>
     <p:spTree>
@@ -8631,7 +8140,7 @@
             </a:pPr>
             <a:fld id="{00000000-1234-1234-1234-123412341234}" type="slidenum">
               <a:rPr lang="en"/>
-              <a:t>8</a:t>
+              <a:t>7</a:t>
             </a:fld>
             <a:endParaRPr/>
           </a:p>
@@ -8650,7 +8159,7 @@
 </p:sld>
 </file>
 
-<file path=ppt/slides/slide9.xml><?xml version="1.0" encoding="utf-8"?>
+<file path=ppt/slides/slide8.xml><?xml version="1.0" encoding="utf-8"?>
 <p:sld xmlns:a="http://schemas.openxmlformats.org/drawingml/2006/main" xmlns:r="http://schemas.openxmlformats.org/officeDocument/2006/relationships" xmlns:p="http://schemas.openxmlformats.org/presentationml/2006/main">
   <p:cSld>
     <p:spTree>
@@ -8757,7 +8266,7 @@
                   <a:schemeClr val="accent3"/>
                 </a:solidFill>
               </a:rPr>
-              <a:t>9</a:t>
+              <a:t>8</a:t>
             </a:fld>
             <a:endParaRPr>
               <a:solidFill>
@@ -10509,6 +10018,200 @@
 </p:sld>
 </file>
 
+<file path=ppt/slides/slide9.xml><?xml version="1.0" encoding="utf-8"?>
+<p:sld xmlns:a="http://schemas.openxmlformats.org/drawingml/2006/main" xmlns:r="http://schemas.openxmlformats.org/officeDocument/2006/relationships" xmlns:p="http://schemas.openxmlformats.org/presentationml/2006/main">
+  <p:cSld>
+    <p:spTree>
+      <p:nvGrpSpPr>
+        <p:cNvPr id="1" name="Shape 309"/>
+        <p:cNvGrpSpPr/>
+        <p:nvPr/>
+      </p:nvGrpSpPr>
+      <p:grpSpPr>
+        <a:xfrm>
+          <a:off x="0" y="0"/>
+          <a:ext cx="0" cy="0"/>
+          <a:chOff x="0" y="0"/>
+          <a:chExt cx="0" cy="0"/>
+        </a:xfrm>
+      </p:grpSpPr>
+      <p:pic>
+        <p:nvPicPr>
+          <p:cNvPr id="310" name="Google Shape;310;p35" descr="photo-1434030216411-0b793f4b4173.jpg"/>
+          <p:cNvPicPr preferRelativeResize="0"/>
+          <p:nvPr/>
+        </p:nvPicPr>
+        <p:blipFill rotWithShape="1">
+          <a:blip r:embed="rId3">
+            <a:alphaModFix/>
+          </a:blip>
+          <a:srcRect l="28831" r="30600"/>
+          <a:stretch/>
+        </p:blipFill>
+        <p:spPr>
+          <a:xfrm>
+            <a:off x="0" y="0"/>
+            <a:ext cx="2086625" cy="5143500"/>
+          </a:xfrm>
+          <a:prstGeom prst="rect">
+            <a:avLst/>
+          </a:prstGeom>
+          <a:noFill/>
+          <a:ln>
+            <a:noFill/>
+          </a:ln>
+        </p:spPr>
+      </p:pic>
+      <p:sp>
+        <p:nvSpPr>
+          <p:cNvPr id="311" name="Google Shape;311;p35"/>
+          <p:cNvSpPr txBox="1">
+            <a:spLocks noGrp="1"/>
+          </p:cNvSpPr>
+          <p:nvPr>
+            <p:ph type="sldNum" idx="12"/>
+          </p:nvPr>
+        </p:nvSpPr>
+        <p:spPr>
+          <a:xfrm>
+            <a:off x="109075" y="146024"/>
+            <a:ext cx="1807200" cy="1252800"/>
+          </a:xfrm>
+          <a:prstGeom prst="rect">
+            <a:avLst/>
+          </a:prstGeom>
+        </p:spPr>
+        <p:txBody>
+          <a:bodyPr spcFirstLastPara="1" wrap="square" lIns="91425" tIns="91425" rIns="91425" bIns="91425" anchor="t" anchorCtr="0">
+            <a:noAutofit/>
+          </a:bodyPr>
+          <a:lstStyle/>
+          <a:p>
+            <a:pPr marL="0" lvl="0" indent="0" algn="l" rtl="0">
+              <a:spcBef>
+                <a:spcPts val="0"/>
+              </a:spcBef>
+              <a:spcAft>
+                <a:spcPts val="0"/>
+              </a:spcAft>
+              <a:buNone/>
+            </a:pPr>
+            <a:fld id="{00000000-1234-1234-1234-123412341234}" type="slidenum">
+              <a:rPr lang="en">
+                <a:solidFill>
+                  <a:srgbClr val="073763"/>
+                </a:solidFill>
+              </a:rPr>
+              <a:t>9</a:t>
+            </a:fld>
+            <a:endParaRPr>
+              <a:solidFill>
+                <a:srgbClr val="073763"/>
+              </a:solidFill>
+            </a:endParaRPr>
+          </a:p>
+        </p:txBody>
+      </p:sp>
+      <p:sp>
+        <p:nvSpPr>
+          <p:cNvPr id="312" name="Google Shape;312;p35"/>
+          <p:cNvSpPr txBox="1">
+            <a:spLocks noGrp="1"/>
+          </p:cNvSpPr>
+          <p:nvPr>
+            <p:ph type="ctrTitle" idx="4294967295"/>
+          </p:nvPr>
+        </p:nvSpPr>
+        <p:spPr>
+          <a:xfrm>
+            <a:off x="2691650" y="440350"/>
+            <a:ext cx="5571300" cy="1159800"/>
+          </a:xfrm>
+          <a:prstGeom prst="rect">
+            <a:avLst/>
+          </a:prstGeom>
+        </p:spPr>
+        <p:txBody>
+          <a:bodyPr spcFirstLastPara="1" wrap="square" lIns="91425" tIns="91425" rIns="91425" bIns="91425" anchor="t" anchorCtr="0">
+            <a:noAutofit/>
+          </a:bodyPr>
+          <a:lstStyle/>
+          <a:p>
+            <a:pPr marL="0" lvl="0" indent="0" algn="l" rtl="0">
+              <a:spcBef>
+                <a:spcPts val="0"/>
+              </a:spcBef>
+              <a:spcAft>
+                <a:spcPts val="0"/>
+              </a:spcAft>
+              <a:buNone/>
+            </a:pPr>
+            <a:r>
+              <a:rPr lang="en" sz="9000">
+                <a:solidFill>
+                  <a:schemeClr val="accent3"/>
+                </a:solidFill>
+              </a:rPr>
+              <a:t>THANKS!</a:t>
+            </a:r>
+            <a:endParaRPr sz="9000">
+              <a:solidFill>
+                <a:schemeClr val="accent3"/>
+              </a:solidFill>
+            </a:endParaRPr>
+          </a:p>
+        </p:txBody>
+      </p:sp>
+      <p:sp>
+        <p:nvSpPr>
+          <p:cNvPr id="313" name="Google Shape;313;p35"/>
+          <p:cNvSpPr txBox="1">
+            <a:spLocks noGrp="1"/>
+          </p:cNvSpPr>
+          <p:nvPr>
+            <p:ph type="subTitle" idx="4294967295"/>
+          </p:nvPr>
+        </p:nvSpPr>
+        <p:spPr>
+          <a:xfrm>
+            <a:off x="2796050" y="1927875"/>
+            <a:ext cx="5571300" cy="643875"/>
+          </a:xfrm>
+          <a:prstGeom prst="rect">
+            <a:avLst/>
+          </a:prstGeom>
+        </p:spPr>
+        <p:txBody>
+          <a:bodyPr spcFirstLastPara="1" wrap="square" lIns="91425" tIns="91425" rIns="91425" bIns="91425" anchor="t" anchorCtr="0">
+            <a:noAutofit/>
+          </a:bodyPr>
+          <a:lstStyle/>
+          <a:p>
+            <a:pPr marL="0" lvl="0" indent="0" algn="l" rtl="0">
+              <a:spcBef>
+                <a:spcPts val="600"/>
+              </a:spcBef>
+              <a:spcAft>
+                <a:spcPts val="0"/>
+              </a:spcAft>
+              <a:buNone/>
+            </a:pPr>
+            <a:r>
+              <a:rPr lang="en" sz="2400" b="1"/>
+              <a:t>Any questions?</a:t>
+            </a:r>
+            <a:endParaRPr sz="2400"/>
+          </a:p>
+        </p:txBody>
+      </p:sp>
+    </p:spTree>
+  </p:cSld>
+  <p:clrMapOvr>
+    <a:masterClrMapping/>
+  </p:clrMapOvr>
+</p:sld>
+</file>
+
 <file path=ppt/theme/theme1.xml><?xml version="1.0" encoding="utf-8"?>
 <a:theme xmlns:a="http://schemas.openxmlformats.org/drawingml/2006/main" name="Aemelia template">
   <a:themeElements>

</xml_diff>